<commit_message>
Inplemented end() for J and P jump and jumpif for Java and Python!
</commit_message>
<xml_diff>
--- a/LEonard/LEonard Design Rev 13.pptx
+++ b/LEonard/LEonard Design Rev 13.pptx
@@ -16118,7 +16118,7 @@
         <p:spPr>
           <a:xfrm>
             <a:off x="5603024" y="1525340"/>
-            <a:ext cx="3229275" cy="2523738"/>
+            <a:ext cx="3463703" cy="3016180"/>
           </a:xfrm>
           <a:prstGeom prst="rect">
             <a:avLst/>
@@ -16195,6 +16195,175 @@
                 <a:cs typeface="Courier New"/>
                 <a:sym typeface="Courier New"/>
               </a:rPr>
+              <a:t>labelname</a:t>
+            </a:r>
+            <a:r>
+              <a:rPr lang="en-US" sz="800" dirty="0">
+                <a:solidFill>
+                  <a:schemeClr val="dk1"/>
+                </a:solidFill>
+                <a:latin typeface="Courier New"/>
+                <a:ea typeface="Courier New"/>
+                <a:cs typeface="Courier New"/>
+                <a:sym typeface="Courier New"/>
+              </a:rPr>
+              <a:t>:</a:t>
+            </a:r>
+          </a:p>
+          <a:p>
+            <a:pPr marL="0" lvl="0" indent="0" algn="l" rtl="0">
+              <a:spcBef>
+                <a:spcPts val="0"/>
+              </a:spcBef>
+              <a:spcAft>
+                <a:spcPts val="0"/>
+              </a:spcAft>
+              <a:buClr>
+                <a:schemeClr val="dk1"/>
+              </a:buClr>
+              <a:buSzPts val="800"/>
+              <a:buFont typeface="Courier New"/>
+              <a:buNone/>
+            </a:pPr>
+            <a:r>
+              <a:rPr lang="en-US" sz="800" dirty="0">
+                <a:solidFill>
+                  <a:schemeClr val="dk1"/>
+                </a:solidFill>
+                <a:latin typeface="Courier New"/>
+                <a:ea typeface="Courier New"/>
+                <a:cs typeface="Courier New"/>
+                <a:sym typeface="Courier New"/>
+              </a:rPr>
+              <a:t>jump(label)</a:t>
+            </a:r>
+          </a:p>
+          <a:p>
+            <a:pPr marL="0" lvl="0" indent="0" algn="l" rtl="0">
+              <a:spcBef>
+                <a:spcPts val="0"/>
+              </a:spcBef>
+              <a:spcAft>
+                <a:spcPts val="0"/>
+              </a:spcAft>
+              <a:buClr>
+                <a:schemeClr val="dk1"/>
+              </a:buClr>
+              <a:buSzPts val="800"/>
+              <a:buFont typeface="Courier New"/>
+              <a:buNone/>
+            </a:pPr>
+            <a:r>
+              <a:rPr lang="en-US" sz="800" dirty="0" err="1">
+                <a:solidFill>
+                  <a:schemeClr val="dk1"/>
+                </a:solidFill>
+                <a:latin typeface="Courier New"/>
+                <a:ea typeface="Courier New"/>
+                <a:cs typeface="Courier New"/>
+                <a:sym typeface="Courier New"/>
+              </a:rPr>
+              <a:t>jumpif</a:t>
+            </a:r>
+            <a:r>
+              <a:rPr lang="en-US" sz="800" dirty="0">
+                <a:solidFill>
+                  <a:schemeClr val="dk1"/>
+                </a:solidFill>
+                <a:latin typeface="Courier New"/>
+                <a:ea typeface="Courier New"/>
+                <a:cs typeface="Courier New"/>
+                <a:sym typeface="Courier New"/>
+              </a:rPr>
+              <a:t>(condition, label) (LEScript has </a:t>
+            </a:r>
+            <a:r>
+              <a:rPr lang="en-US" sz="800" dirty="0" err="1">
+                <a:solidFill>
+                  <a:schemeClr val="dk1"/>
+                </a:solidFill>
+                <a:latin typeface="Courier New"/>
+                <a:ea typeface="Courier New"/>
+                <a:cs typeface="Courier New"/>
+                <a:sym typeface="Courier New"/>
+              </a:rPr>
+              <a:t>jump_gt_zero</a:t>
+            </a:r>
+            <a:r>
+              <a:rPr lang="en-US" sz="800">
+                <a:solidFill>
+                  <a:schemeClr val="dk1"/>
+                </a:solidFill>
+                <a:latin typeface="Courier New"/>
+                <a:ea typeface="Courier New"/>
+                <a:cs typeface="Courier New"/>
+                <a:sym typeface="Courier New"/>
+              </a:rPr>
+              <a:t>)</a:t>
+            </a:r>
+            <a:endParaRPr lang="en-US" sz="800" dirty="0">
+              <a:solidFill>
+                <a:schemeClr val="dk1"/>
+              </a:solidFill>
+              <a:latin typeface="Courier New"/>
+              <a:ea typeface="Courier New"/>
+              <a:cs typeface="Courier New"/>
+              <a:sym typeface="Courier New"/>
+            </a:endParaRPr>
+          </a:p>
+          <a:p>
+            <a:pPr marL="0" lvl="0" indent="0" algn="l" rtl="0">
+              <a:spcBef>
+                <a:spcPts val="0"/>
+              </a:spcBef>
+              <a:spcAft>
+                <a:spcPts val="0"/>
+              </a:spcAft>
+              <a:buClr>
+                <a:schemeClr val="dk1"/>
+              </a:buClr>
+              <a:buSzPts val="800"/>
+              <a:buFont typeface="Courier New"/>
+              <a:buNone/>
+            </a:pPr>
+            <a:r>
+              <a:rPr lang="en-US" sz="800" dirty="0">
+                <a:solidFill>
+                  <a:schemeClr val="dk1"/>
+                </a:solidFill>
+                <a:latin typeface="Courier New"/>
+                <a:ea typeface="Courier New"/>
+                <a:cs typeface="Courier New"/>
+                <a:sym typeface="Courier New"/>
+              </a:rPr>
+              <a:t>end()</a:t>
+            </a:r>
+          </a:p>
+          <a:p>
+            <a:pPr marL="0" lvl="0" indent="0" algn="l" rtl="0">
+              <a:spcBef>
+                <a:spcPts val="0"/>
+              </a:spcBef>
+              <a:spcAft>
+                <a:spcPts val="0"/>
+              </a:spcAft>
+              <a:buClr>
+                <a:schemeClr val="dk1"/>
+              </a:buClr>
+              <a:buSzPts val="800"/>
+              <a:buFont typeface="Courier New"/>
+              <a:buNone/>
+            </a:pPr>
+            <a:r>
+              <a:rPr lang="en-US" sz="800" dirty="0" err="1">
+                <a:solidFill>
+                  <a:schemeClr val="dk1"/>
+                </a:solidFill>
+                <a:latin typeface="Courier New"/>
+                <a:ea typeface="Courier New"/>
+                <a:cs typeface="Courier New"/>
+                <a:sym typeface="Courier New"/>
+              </a:rPr>
               <a:t>lePrint</a:t>
             </a:r>
             <a:r>
@@ -16410,7 +16579,7 @@
                 <a:cs typeface="Courier New"/>
                 <a:sym typeface="Courier New"/>
               </a:rPr>
-              <a:t>)</a:t>
+              <a:t> Line)</a:t>
             </a:r>
             <a:endParaRPr sz="800" dirty="0">
               <a:solidFill>
@@ -16689,7 +16858,7 @@
               <a:buNone/>
             </a:pPr>
             <a:r>
-              <a:rPr lang="sv-SE" sz="800">
+              <a:rPr lang="sv-SE" sz="800" dirty="0">
                 <a:solidFill>
                   <a:schemeClr val="dk1"/>
                 </a:solidFill>
@@ -16717,7 +16886,7 @@
               <a:buNone/>
             </a:pPr>
             <a:r>
-              <a:rPr lang="sv-SE" sz="800">
+              <a:rPr lang="sv-SE" sz="800" dirty="0">
                 <a:solidFill>
                   <a:schemeClr val="dk1"/>
                 </a:solidFill>
@@ -16726,19 +16895,7 @@
                 <a:cs typeface="Courier New"/>
                 <a:sym typeface="Courier New"/>
               </a:rPr>
-              <a:t>leWriteVar</a:t>
-            </a:r>
-            <a:r>
-              <a:rPr lang="sv-SE" sz="800" dirty="0">
-                <a:solidFill>
-                  <a:schemeClr val="dk1"/>
-                </a:solidFill>
-                <a:latin typeface="Courier New"/>
-                <a:ea typeface="Courier New"/>
-                <a:cs typeface="Courier New"/>
-                <a:sym typeface="Courier New"/>
-              </a:rPr>
-              <a:t>(varName, value)</a:t>
+              <a:t>leWriteVar(varName, value)</a:t>
             </a:r>
             <a:endParaRPr lang="sv-SE" sz="800" dirty="0"/>
           </a:p>

</xml_diff>

<commit_message>
CSV file input done in Python!
</commit_message>
<xml_diff>
--- a/LEonard/LEonard Design Rev 13.pptx
+++ b/LEonard/LEonard Design Rev 13.pptx
@@ -1101,7 +1101,7 @@
         </p:nvSpPr>
         <p:spPr>
           <a:xfrm>
-            <a:off x="381300" y="685800"/>
+            <a:off x="381000" y="685800"/>
             <a:ext cx="6096000" cy="3429000"/>
           </a:xfrm>
           <a:custGeom>
@@ -15128,10 +15128,10 @@
               <a:buChar char="•"/>
             </a:pPr>
             <a:r>
-              <a:rPr lang="en-US"/>
+              <a:rPr lang="en-US" dirty="0"/>
               <a:t>LEScript, Java, and Python have independent variables</a:t>
             </a:r>
-            <a:endParaRPr/>
+            <a:endParaRPr dirty="0"/>
           </a:p>
           <a:p>
             <a:pPr marL="457200" lvl="0" indent="-342900" algn="l" rtl="0">
@@ -15145,10 +15145,14 @@
               <a:buChar char="•"/>
             </a:pPr>
             <a:r>
-              <a:rPr lang="en-US"/>
-              <a:t>LEVariables are variables created in LEScript</a:t>
-            </a:r>
-            <a:endParaRPr/>
+              <a:rPr lang="en-US" dirty="0" err="1"/>
+              <a:t>LEVariables</a:t>
+            </a:r>
+            <a:r>
+              <a:rPr lang="en-US" dirty="0"/>
+              <a:t> are variables created in LEScript</a:t>
+            </a:r>
+            <a:endParaRPr dirty="0"/>
           </a:p>
           <a:p>
             <a:pPr marL="914400" lvl="1" indent="-342900" algn="l" rtl="0">
@@ -15162,10 +15166,18 @@
               <a:buChar char="•"/>
             </a:pPr>
             <a:r>
-              <a:rPr lang="en-US"/>
-              <a:t>All LEVariables duplicated to Java and Python</a:t>
-            </a:r>
-            <a:endParaRPr/>
+              <a:rPr lang="en-US" dirty="0"/>
+              <a:t>All </a:t>
+            </a:r>
+            <a:r>
+              <a:rPr lang="en-US" dirty="0" err="1"/>
+              <a:t>LEVariables</a:t>
+            </a:r>
+            <a:r>
+              <a:rPr lang="en-US" dirty="0"/>
+              <a:t> duplicated to Java and Python</a:t>
+            </a:r>
+            <a:endParaRPr dirty="0"/>
           </a:p>
           <a:p>
             <a:pPr marL="914400" lvl="1" indent="-342900" algn="l" rtl="0">
@@ -15179,10 +15191,14 @@
               <a:buChar char="•"/>
             </a:pPr>
             <a:r>
-              <a:rPr lang="en-US"/>
-              <a:t>LEVariables are all strings</a:t>
-            </a:r>
-            <a:endParaRPr/>
+              <a:rPr lang="en-US" dirty="0" err="1"/>
+              <a:t>LEVariables</a:t>
+            </a:r>
+            <a:r>
+              <a:rPr lang="en-US" dirty="0"/>
+              <a:t> are all strings</a:t>
+            </a:r>
+            <a:endParaRPr dirty="0"/>
           </a:p>
           <a:p>
             <a:pPr marL="914400" lvl="1" indent="-342900" algn="l" rtl="0">
@@ -15196,10 +15212,14 @@
               <a:buChar char="•"/>
             </a:pPr>
             <a:r>
-              <a:rPr lang="en-US"/>
-              <a:t>A Java or Python variable can be written back to LEVariables</a:t>
-            </a:r>
-            <a:endParaRPr/>
+              <a:rPr lang="en-US" dirty="0"/>
+              <a:t>A Java or Python variable can be written back to </a:t>
+            </a:r>
+            <a:r>
+              <a:rPr lang="en-US" dirty="0" err="1"/>
+              <a:t>LEVariables</a:t>
+            </a:r>
+            <a:endParaRPr dirty="0"/>
           </a:p>
           <a:p>
             <a:pPr marL="1371600" lvl="2" indent="-342900" algn="l" rtl="0">
@@ -15213,10 +15233,14 @@
               <a:buChar char="•"/>
             </a:pPr>
             <a:r>
-              <a:rPr lang="en-US"/>
-              <a:t>leWriteVar(‘name’, value)</a:t>
-            </a:r>
-            <a:endParaRPr/>
+              <a:rPr lang="en-US" dirty="0" err="1"/>
+              <a:t>leWriteVar</a:t>
+            </a:r>
+            <a:r>
+              <a:rPr lang="en-US" dirty="0"/>
+              <a:t>(‘name’, value)</a:t>
+            </a:r>
+            <a:endParaRPr dirty="0"/>
           </a:p>
           <a:p>
             <a:pPr marL="457200" lvl="0" indent="-342900" algn="l" rtl="0">
@@ -15230,10 +15254,14 @@
               <a:buChar char="•"/>
             </a:pPr>
             <a:r>
-              <a:rPr lang="en-US"/>
-              <a:t>There are some special system LEVariables</a:t>
-            </a:r>
-            <a:endParaRPr/>
+              <a:rPr lang="en-US" dirty="0"/>
+              <a:t>There are some special system </a:t>
+            </a:r>
+            <a:r>
+              <a:rPr lang="en-US" dirty="0" err="1"/>
+              <a:t>LEVariables</a:t>
+            </a:r>
+            <a:endParaRPr dirty="0"/>
           </a:p>
           <a:p>
             <a:pPr marL="914400" lvl="1" indent="-342900" algn="l" rtl="0">
@@ -15247,10 +15275,30 @@
               <a:buChar char="•"/>
             </a:pPr>
             <a:r>
-              <a:rPr lang="en-US"/>
-              <a:t>DateTime: Current yyyy-MM-ddTHH-mm-ss</a:t>
-            </a:r>
-            <a:endParaRPr/>
+              <a:rPr lang="en-US" dirty="0" err="1"/>
+              <a:t>DateTime</a:t>
+            </a:r>
+            <a:r>
+              <a:rPr lang="en-US" dirty="0"/>
+              <a:t>: Current </a:t>
+            </a:r>
+            <a:r>
+              <a:rPr lang="en-US" dirty="0" err="1"/>
+              <a:t>yyyy</a:t>
+            </a:r>
+            <a:r>
+              <a:rPr lang="en-US" dirty="0"/>
+              <a:t>-MM-</a:t>
+            </a:r>
+            <a:r>
+              <a:rPr lang="en-US" dirty="0" err="1"/>
+              <a:t>ddTHH</a:t>
+            </a:r>
+            <a:r>
+              <a:rPr lang="en-US" dirty="0"/>
+              <a:t>-mm-ss</a:t>
+            </a:r>
+            <a:endParaRPr dirty="0"/>
           </a:p>
           <a:p>
             <a:pPr marL="914400" lvl="1" indent="-342900" algn="l" rtl="0">
@@ -15264,10 +15312,14 @@
               <a:buChar char="•"/>
             </a:pPr>
             <a:r>
-              <a:rPr lang="en-US"/>
-              <a:t>LEScriptFilename: currently executing LEScript program</a:t>
-            </a:r>
-            <a:endParaRPr/>
+              <a:rPr lang="en-US" dirty="0" err="1"/>
+              <a:t>LEScriptFilename</a:t>
+            </a:r>
+            <a:r>
+              <a:rPr lang="en-US" dirty="0"/>
+              <a:t>: currently executing LEScript program</a:t>
+            </a:r>
+            <a:endParaRPr dirty="0"/>
           </a:p>
           <a:p>
             <a:pPr marL="914400" lvl="1" indent="-342900" algn="l" rtl="0">
@@ -15281,10 +15333,46 @@
               <a:buChar char="•"/>
             </a:pPr>
             <a:r>
+              <a:rPr lang="en-US" dirty="0" err="1"/>
+              <a:t>LEonardLanguage</a:t>
+            </a:r>
+            <a:r>
+              <a:rPr lang="en-US" dirty="0"/>
+              <a:t>: Current language executing in LEScript </a:t>
+            </a:r>
+          </a:p>
+          <a:p>
+            <a:pPr marL="914400" lvl="1" indent="-342900" algn="l" rtl="0">
+              <a:spcBef>
+                <a:spcPts val="0"/>
+              </a:spcBef>
+              <a:spcAft>
+                <a:spcPts val="0"/>
+              </a:spcAft>
+              <a:buSzPts val="1800"/>
+              <a:buChar char="•"/>
+            </a:pPr>
+            <a:r>
+              <a:rPr lang="en-US" dirty="0" err="1"/>
+              <a:t>LEonardRoot</a:t>
+            </a:r>
+            <a:r>
+              <a:rPr lang="en-US" dirty="0"/>
+              <a:t>: </a:t>
+            </a:r>
+            <a:r>
+              <a:rPr lang="en-US" dirty="0" err="1"/>
+              <a:t>Flder</a:t>
+            </a:r>
+            <a:r>
               <a:rPr lang="en-US"/>
-              <a:t>LEonardLanguage: Current language executing in LEScript  </a:t>
-            </a:r>
-            <a:endParaRPr/>
+              <a:t> where </a:t>
+            </a:r>
+            <a:r>
+              <a:rPr lang="en-US" dirty="0"/>
+              <a:t>LEonard is running </a:t>
+            </a:r>
+            <a:endParaRPr dirty="0"/>
           </a:p>
           <a:p>
             <a:pPr marL="0" lvl="0" indent="0" algn="l" rtl="0">
@@ -15297,10 +15385,10 @@
               <a:buNone/>
             </a:pPr>
             <a:r>
-              <a:rPr lang="en-US"/>
+              <a:rPr lang="en-US" dirty="0"/>
               <a:t>	</a:t>
             </a:r>
-            <a:endParaRPr/>
+            <a:endParaRPr dirty="0"/>
           </a:p>
           <a:p>
             <a:pPr marL="0" lvl="0" indent="0" algn="l" rtl="0">
@@ -15312,7 +15400,7 @@
               </a:spcAft>
               <a:buNone/>
             </a:pPr>
-            <a:endParaRPr/>
+            <a:endParaRPr dirty="0"/>
           </a:p>
         </p:txBody>
       </p:sp>
@@ -16290,7 +16378,7 @@
               <a:t>jump_gt_zero</a:t>
             </a:r>
             <a:r>
-              <a:rPr lang="en-US" sz="800">
+              <a:rPr lang="en-US" sz="800" dirty="0">
                 <a:solidFill>
                   <a:schemeClr val="dk1"/>
                 </a:solidFill>
@@ -16301,15 +16389,6 @@
               </a:rPr>
               <a:t>)</a:t>
             </a:r>
-            <a:endParaRPr lang="en-US" sz="800" dirty="0">
-              <a:solidFill>
-                <a:schemeClr val="dk1"/>
-              </a:solidFill>
-              <a:latin typeface="Courier New"/>
-              <a:ea typeface="Courier New"/>
-              <a:cs typeface="Courier New"/>
-              <a:sym typeface="Courier New"/>
-            </a:endParaRPr>
           </a:p>
           <a:p>
             <a:pPr marL="0" lvl="0" indent="0" algn="l" rtl="0">

</xml_diff>

<commit_message>
Manual updates UI cleanups, small
</commit_message>
<xml_diff>
--- a/LEonard/LEonard Design Rev 13.pptx
+++ b/LEonard/LEonard Design Rev 13.pptx
@@ -261,7 +261,7 @@
       </p15:sldGuideLst>
     </p:ext>
     <p:ext uri="http://customooxmlschemas.google.com/">
-      <go:slidesCustomData xmlns:go="http://customooxmlschemas.google.com/" xmlns:ahyp="http://schemas.microsoft.com/office/drawing/2018/hyperlinkcolor" xmlns:p15="http://schemas.microsoft.com/office/powerpoint/2012/main" xmlns:p14="http://schemas.microsoft.com/office/powerpoint/2010/main" xmlns:com="http://schemas.openxmlformats.org/drawingml/2006/compatibility" xmlns:pvml="urn:schemas-microsoft-com:office:powerpoint" xmlns:v="urn:schemas-microsoft-com:vml" xmlns:o="urn:schemas-microsoft-com:office:office" xmlns:dgm="http://schemas.openxmlformats.org/drawingml/2006/diagram" xmlns:c="http://schemas.openxmlformats.org/drawingml/2006/chart" xmlns:mv="urn:schemas-microsoft-com:mac:vml" xmlns:mc="http://schemas.openxmlformats.org/markup-compatibility/2006" xmlns="" r:id="rId11" roundtripDataSignature="AMtx7mjwwalkTiEBhHcEFou5XsHvWmkBqA=="/>
+      <go:slidesCustomData xmlns="" xmlns:mc="http://schemas.openxmlformats.org/markup-compatibility/2006" xmlns:mv="urn:schemas-microsoft-com:mac:vml" xmlns:c="http://schemas.openxmlformats.org/drawingml/2006/chart" xmlns:dgm="http://schemas.openxmlformats.org/drawingml/2006/diagram" xmlns:o="urn:schemas-microsoft-com:office:office" xmlns:v="urn:schemas-microsoft-com:vml" xmlns:pvml="urn:schemas-microsoft-com:office:powerpoint" xmlns:com="http://schemas.openxmlformats.org/drawingml/2006/compatibility" xmlns:p14="http://schemas.microsoft.com/office/powerpoint/2010/main" xmlns:p15="http://schemas.microsoft.com/office/powerpoint/2012/main" xmlns:ahyp="http://schemas.microsoft.com/office/drawing/2018/hyperlinkcolor" xmlns:go="http://customooxmlschemas.google.com/" r:id="rId11" roundtripDataSignature="AMtx7mjwwalkTiEBhHcEFou5XsHvWmkBqA=="/>
     </p:ext>
   </p:extLst>
 </p:presentation>
@@ -15113,7 +15113,7 @@
         </p:spPr>
         <p:txBody>
           <a:bodyPr spcFirstLastPara="1" wrap="square" lIns="91425" tIns="45700" rIns="91425" bIns="45700" anchor="t" anchorCtr="0">
-            <a:normAutofit lnSpcReduction="10000"/>
+            <a:normAutofit/>
           </a:bodyPr>
           <a:lstStyle/>
           <a:p>
@@ -15175,7 +15175,7 @@
             </a:r>
             <a:r>
               <a:rPr lang="en-US" dirty="0"/>
-              <a:t> duplicated to Java and Python</a:t>
+              <a:t> are duplicated to Java and Python</a:t>
             </a:r>
             <a:endParaRPr dirty="0"/>
           </a:p>
@@ -15358,35 +15358,7 @@
             </a:r>
             <a:r>
               <a:rPr lang="en-US" dirty="0"/>
-              <a:t>: </a:t>
-            </a:r>
-            <a:r>
-              <a:rPr lang="en-US" dirty="0" err="1"/>
-              <a:t>Flder</a:t>
-            </a:r>
-            <a:r>
-              <a:rPr lang="en-US"/>
-              <a:t> where </a:t>
-            </a:r>
-            <a:r>
-              <a:rPr lang="en-US" dirty="0"/>
-              <a:t>LEonard is running </a:t>
-            </a:r>
-            <a:endParaRPr dirty="0"/>
-          </a:p>
-          <a:p>
-            <a:pPr marL="0" lvl="0" indent="0" algn="l" rtl="0">
-              <a:spcBef>
-                <a:spcPts val="750"/>
-              </a:spcBef>
-              <a:spcAft>
-                <a:spcPts val="0"/>
-              </a:spcAft>
-              <a:buNone/>
-            </a:pPr>
-            <a:r>
-              <a:rPr lang="en-US" dirty="0"/>
-              <a:t>	</a:t>
+              <a:t>: Folder for the LEonard directory “tree” 	</a:t>
             </a:r>
             <a:endParaRPr dirty="0"/>
           </a:p>

</xml_diff>

<commit_message>
Doumentation cleanup Consitency Naming conventions
</commit_message>
<xml_diff>
--- a/LEonard/LEonard Design Rev 13.pptx
+++ b/LEonard/LEonard Design Rev 13.pptx
@@ -261,7 +261,7 @@
       </p15:sldGuideLst>
     </p:ext>
     <p:ext uri="http://customooxmlschemas.google.com/">
-      <go:slidesCustomData xmlns="" xmlns:mc="http://schemas.openxmlformats.org/markup-compatibility/2006" xmlns:mv="urn:schemas-microsoft-com:mac:vml" xmlns:c="http://schemas.openxmlformats.org/drawingml/2006/chart" xmlns:dgm="http://schemas.openxmlformats.org/drawingml/2006/diagram" xmlns:o="urn:schemas-microsoft-com:office:office" xmlns:v="urn:schemas-microsoft-com:vml" xmlns:pvml="urn:schemas-microsoft-com:office:powerpoint" xmlns:com="http://schemas.openxmlformats.org/drawingml/2006/compatibility" xmlns:p14="http://schemas.microsoft.com/office/powerpoint/2010/main" xmlns:p15="http://schemas.microsoft.com/office/powerpoint/2012/main" xmlns:ahyp="http://schemas.microsoft.com/office/drawing/2018/hyperlinkcolor" xmlns:go="http://customooxmlschemas.google.com/" r:id="rId11" roundtripDataSignature="AMtx7mjwwalkTiEBhHcEFou5XsHvWmkBqA=="/>
+      <go:slidesCustomData xmlns:go="http://customooxmlschemas.google.com/" xmlns:ahyp="http://schemas.microsoft.com/office/drawing/2018/hyperlinkcolor" xmlns:p15="http://schemas.microsoft.com/office/powerpoint/2012/main" xmlns:p14="http://schemas.microsoft.com/office/powerpoint/2010/main" xmlns:com="http://schemas.openxmlformats.org/drawingml/2006/compatibility" xmlns:pvml="urn:schemas-microsoft-com:office:powerpoint" xmlns:v="urn:schemas-microsoft-com:vml" xmlns:o="urn:schemas-microsoft-com:office:office" xmlns:dgm="http://schemas.openxmlformats.org/drawingml/2006/diagram" xmlns:c="http://schemas.openxmlformats.org/drawingml/2006/chart" xmlns:mv="urn:schemas-microsoft-com:mac:vml" xmlns:mc="http://schemas.openxmlformats.org/markup-compatibility/2006" xmlns="" r:id="rId11" roundtripDataSignature="AMtx7mjwwalkTiEBhHcEFou5XsHvWmkBqA=="/>
     </p:ext>
   </p:extLst>
 </p:presentation>
@@ -15495,7 +15495,7 @@
               <a:buNone/>
             </a:pPr>
             <a:r>
-              <a:rPr lang="en-US" sz="800" b="1">
+              <a:rPr lang="en-US" sz="800" b="1" dirty="0" err="1">
                 <a:solidFill>
                   <a:schemeClr val="dk1"/>
                 </a:solidFill>
@@ -15506,7 +15506,7 @@
               </a:rPr>
               <a:t>LEonardRecipe</a:t>
             </a:r>
-            <a:endParaRPr sz="800" b="1">
+            <a:endParaRPr sz="800" b="1" dirty="0">
               <a:solidFill>
                 <a:schemeClr val="dk1"/>
               </a:solidFill>
@@ -15532,7 +15532,7 @@
               <a:buNone/>
             </a:pPr>
             <a:r>
-              <a:rPr lang="en-US" sz="800">
+              <a:rPr lang="en-US" sz="800" dirty="0">
                 <a:solidFill>
                   <a:schemeClr val="dk1"/>
                 </a:solidFill>
@@ -15543,7 +15543,7 @@
               </a:rPr>
               <a:t>LEScript</a:t>
             </a:r>
-            <a:endParaRPr/>
+            <a:endParaRPr dirty="0"/>
           </a:p>
           <a:p>
             <a:pPr marL="0" marR="0" lvl="0" indent="0" algn="l" rtl="0">
@@ -15556,7 +15556,7 @@
               <a:buNone/>
             </a:pPr>
             <a:r>
-              <a:rPr lang="en-US" sz="800">
+              <a:rPr lang="en-US" sz="800" dirty="0">
                 <a:solidFill>
                   <a:schemeClr val="dk1"/>
                 </a:solidFill>
@@ -15567,7 +15567,7 @@
               </a:rPr>
               <a:t>LEScript</a:t>
             </a:r>
-            <a:endParaRPr/>
+            <a:endParaRPr dirty="0"/>
           </a:p>
           <a:p>
             <a:pPr marL="0" marR="0" lvl="0" indent="0" algn="l" rtl="0">
@@ -15585,7 +15585,7 @@
               <a:buNone/>
             </a:pPr>
             <a:r>
-              <a:rPr lang="en-US" sz="800">
+              <a:rPr lang="en-US" sz="800" dirty="0">
                 <a:solidFill>
                   <a:schemeClr val="dk1"/>
                 </a:solidFill>
@@ -15596,7 +15596,7 @@
               </a:rPr>
               <a:t>…</a:t>
             </a:r>
-            <a:endParaRPr/>
+            <a:endParaRPr dirty="0"/>
           </a:p>
           <a:p>
             <a:pPr marL="0" marR="0" lvl="0" indent="0" algn="l" rtl="0">
@@ -15614,7 +15614,7 @@
               <a:buNone/>
             </a:pPr>
             <a:r>
-              <a:rPr lang="en-US" sz="800">
+              <a:rPr lang="en-US" sz="800" dirty="0">
                 <a:solidFill>
                   <a:schemeClr val="dk1"/>
                 </a:solidFill>
@@ -15625,7 +15625,7 @@
               </a:rPr>
               <a:t>call(label1)</a:t>
             </a:r>
-            <a:endParaRPr/>
+            <a:endParaRPr dirty="0"/>
           </a:p>
           <a:p>
             <a:pPr marL="0" marR="0" lvl="0" indent="0" algn="l" rtl="0">
@@ -15643,7 +15643,7 @@
               <a:buNone/>
             </a:pPr>
             <a:r>
-              <a:rPr lang="en-US" sz="800">
+              <a:rPr lang="en-US" sz="800" dirty="0">
                 <a:solidFill>
                   <a:schemeClr val="dk1"/>
                 </a:solidFill>
@@ -15654,7 +15654,7 @@
               </a:rPr>
               <a:t>…</a:t>
             </a:r>
-            <a:endParaRPr/>
+            <a:endParaRPr dirty="0"/>
           </a:p>
           <a:p>
             <a:pPr marL="0" marR="0" lvl="0" indent="0" algn="l" rtl="0">
@@ -15672,7 +15672,7 @@
               <a:buNone/>
             </a:pPr>
             <a:r>
-              <a:rPr lang="en-US" sz="800">
+              <a:rPr lang="en-US" sz="800" dirty="0" err="1">
                 <a:solidFill>
                   <a:schemeClr val="dk1"/>
                 </a:solidFill>
@@ -15681,27 +15681,10 @@
                 <a:cs typeface="Courier New"/>
                 <a:sym typeface="Courier New"/>
               </a:rPr>
-              <a:t>exec_java(JavaProgram.js)</a:t>
-            </a:r>
-            <a:endParaRPr/>
-          </a:p>
-          <a:p>
-            <a:pPr marL="0" marR="0" lvl="0" indent="0" algn="l" rtl="0">
-              <a:spcBef>
-                <a:spcPts val="0"/>
-              </a:spcBef>
-              <a:spcAft>
-                <a:spcPts val="0"/>
-              </a:spcAft>
-              <a:buClr>
-                <a:schemeClr val="dk1"/>
-              </a:buClr>
-              <a:buSzPts val="800"/>
-              <a:buFont typeface="Courier New"/>
-              <a:buNone/>
-            </a:pPr>
-            <a:r>
-              <a:rPr lang="en-US" sz="800">
+              <a:t>exec_java</a:t>
+            </a:r>
+            <a:r>
+              <a:rPr lang="en-US" sz="800" dirty="0">
                 <a:solidFill>
                   <a:schemeClr val="dk1"/>
                 </a:solidFill>
@@ -15710,9 +15693,9 @@
                 <a:cs typeface="Courier New"/>
                 <a:sym typeface="Courier New"/>
               </a:rPr>
-              <a:t>…</a:t>
-            </a:r>
-            <a:endParaRPr/>
+              <a:t>(JavaProgram.js)</a:t>
+            </a:r>
+            <a:endParaRPr dirty="0"/>
           </a:p>
           <a:p>
             <a:pPr marL="0" marR="0" lvl="0" indent="0" algn="l" rtl="0">
@@ -15730,7 +15713,7 @@
               <a:buNone/>
             </a:pPr>
             <a:r>
-              <a:rPr lang="en-US" sz="800">
+              <a:rPr lang="en-US" sz="800" dirty="0">
                 <a:solidFill>
                   <a:schemeClr val="dk1"/>
                 </a:solidFill>
@@ -15739,9 +15722,9 @@
                 <a:cs typeface="Courier New"/>
                 <a:sym typeface="Courier New"/>
               </a:rPr>
-              <a:t>exec_python(PythonProgram.py)</a:t>
-            </a:r>
-            <a:endParaRPr/>
+              <a:t>…</a:t>
+            </a:r>
+            <a:endParaRPr dirty="0"/>
           </a:p>
           <a:p>
             <a:pPr marL="0" marR="0" lvl="0" indent="0" algn="l" rtl="0">
@@ -15759,7 +15742,7 @@
               <a:buNone/>
             </a:pPr>
             <a:r>
-              <a:rPr lang="en-US" sz="800">
+              <a:rPr lang="en-US" sz="800" dirty="0" err="1">
                 <a:solidFill>
                   <a:schemeClr val="dk1"/>
                 </a:solidFill>
@@ -15768,27 +15751,10 @@
                 <a:cs typeface="Courier New"/>
                 <a:sym typeface="Courier New"/>
               </a:rPr>
-              <a:t>…</a:t>
-            </a:r>
-            <a:endParaRPr/>
-          </a:p>
-          <a:p>
-            <a:pPr marL="0" marR="0" lvl="0" indent="0" algn="l" rtl="0">
-              <a:spcBef>
-                <a:spcPts val="0"/>
-              </a:spcBef>
-              <a:spcAft>
-                <a:spcPts val="0"/>
-              </a:spcAft>
-              <a:buClr>
-                <a:schemeClr val="dk1"/>
-              </a:buClr>
-              <a:buSzPts val="800"/>
-              <a:buFont typeface="Courier New"/>
-              <a:buNone/>
-            </a:pPr>
-            <a:r>
-              <a:rPr lang="en-US" sz="800">
+              <a:t>exec_python</a:t>
+            </a:r>
+            <a:r>
+              <a:rPr lang="en-US" sz="800" dirty="0">
                 <a:solidFill>
                   <a:schemeClr val="dk1"/>
                 </a:solidFill>
@@ -15797,9 +15763,67 @@
                 <a:cs typeface="Courier New"/>
                 <a:sym typeface="Courier New"/>
               </a:rPr>
+              <a:t>(PythonProgram.py)</a:t>
+            </a:r>
+            <a:endParaRPr dirty="0"/>
+          </a:p>
+          <a:p>
+            <a:pPr marL="0" marR="0" lvl="0" indent="0" algn="l" rtl="0">
+              <a:spcBef>
+                <a:spcPts val="0"/>
+              </a:spcBef>
+              <a:spcAft>
+                <a:spcPts val="0"/>
+              </a:spcAft>
+              <a:buClr>
+                <a:schemeClr val="dk1"/>
+              </a:buClr>
+              <a:buSzPts val="800"/>
+              <a:buFont typeface="Courier New"/>
+              <a:buNone/>
+            </a:pPr>
+            <a:r>
+              <a:rPr lang="en-US" sz="800" dirty="0">
+                <a:solidFill>
+                  <a:schemeClr val="dk1"/>
+                </a:solidFill>
+                <a:latin typeface="Courier New"/>
+                <a:ea typeface="Courier New"/>
+                <a:cs typeface="Courier New"/>
+                <a:sym typeface="Courier New"/>
+              </a:rPr>
+              <a:t>…</a:t>
+            </a:r>
+            <a:endParaRPr dirty="0"/>
+          </a:p>
+          <a:p>
+            <a:pPr marL="0" marR="0" lvl="0" indent="0" algn="l" rtl="0">
+              <a:spcBef>
+                <a:spcPts val="0"/>
+              </a:spcBef>
+              <a:spcAft>
+                <a:spcPts val="0"/>
+              </a:spcAft>
+              <a:buClr>
+                <a:schemeClr val="dk1"/>
+              </a:buClr>
+              <a:buSzPts val="800"/>
+              <a:buFont typeface="Courier New"/>
+              <a:buNone/>
+            </a:pPr>
+            <a:r>
+              <a:rPr lang="en-US" sz="800" dirty="0">
+                <a:solidFill>
+                  <a:schemeClr val="dk1"/>
+                </a:solidFill>
+                <a:latin typeface="Courier New"/>
+                <a:ea typeface="Courier New"/>
+                <a:cs typeface="Courier New"/>
+                <a:sym typeface="Courier New"/>
+              </a:rPr>
               <a:t>end</a:t>
             </a:r>
-            <a:endParaRPr/>
+            <a:endParaRPr dirty="0"/>
           </a:p>
           <a:p>
             <a:pPr marL="0" marR="0" lvl="0" indent="0" algn="l" rtl="0">
@@ -15816,7 +15840,7 @@
               <a:buFont typeface="Calibri"/>
               <a:buNone/>
             </a:pPr>
-            <a:endParaRPr sz="800">
+            <a:endParaRPr sz="800" dirty="0">
               <a:solidFill>
                 <a:schemeClr val="dk1"/>
               </a:solidFill>
@@ -15842,7 +15866,7 @@
               <a:buNone/>
             </a:pPr>
             <a:r>
-              <a:rPr lang="en-US" sz="800">
+              <a:rPr lang="en-US" sz="800" dirty="0">
                 <a:solidFill>
                   <a:schemeClr val="dk1"/>
                 </a:solidFill>
@@ -15853,7 +15877,7 @@
               </a:rPr>
               <a:t>label1:</a:t>
             </a:r>
-            <a:endParaRPr/>
+            <a:endParaRPr dirty="0"/>
           </a:p>
           <a:p>
             <a:pPr marL="0" marR="0" lvl="0" indent="0" algn="l" rtl="0">
@@ -15871,7 +15895,7 @@
               <a:buNone/>
             </a:pPr>
             <a:r>
-              <a:rPr lang="en-US" sz="800">
+              <a:rPr lang="en-US" sz="800" dirty="0">
                 <a:solidFill>
                   <a:schemeClr val="dk1"/>
                 </a:solidFill>
@@ -15882,7 +15906,7 @@
               </a:rPr>
               <a:t>LEScript</a:t>
             </a:r>
-            <a:endParaRPr/>
+            <a:endParaRPr dirty="0"/>
           </a:p>
           <a:p>
             <a:pPr marL="0" marR="0" lvl="0" indent="0" algn="l" rtl="0">
@@ -15895,7 +15919,7 @@
               <a:buNone/>
             </a:pPr>
             <a:r>
-              <a:rPr lang="en-US" sz="800">
+              <a:rPr lang="en-US" sz="800" dirty="0">
                 <a:solidFill>
                   <a:schemeClr val="dk1"/>
                 </a:solidFill>
@@ -15906,7 +15930,7 @@
               </a:rPr>
               <a:t>LEScript</a:t>
             </a:r>
-            <a:endParaRPr/>
+            <a:endParaRPr dirty="0"/>
           </a:p>
           <a:p>
             <a:pPr marL="0" marR="0" lvl="0" indent="0" algn="l" rtl="0">
@@ -15919,7 +15943,7 @@
               <a:buNone/>
             </a:pPr>
             <a:r>
-              <a:rPr lang="en-US" sz="800">
+              <a:rPr lang="en-US" sz="800" dirty="0">
                 <a:solidFill>
                   <a:schemeClr val="dk1"/>
                 </a:solidFill>
@@ -15930,7 +15954,7 @@
               </a:rPr>
               <a:t>…</a:t>
             </a:r>
-            <a:endParaRPr/>
+            <a:endParaRPr dirty="0"/>
           </a:p>
           <a:p>
             <a:pPr marL="0" marR="0" lvl="0" indent="0" algn="l" rtl="0">
@@ -15948,7 +15972,7 @@
               <a:buNone/>
             </a:pPr>
             <a:r>
-              <a:rPr lang="en-US" sz="800">
+              <a:rPr lang="en-US" sz="800" dirty="0">
                 <a:solidFill>
                   <a:schemeClr val="dk1"/>
                 </a:solidFill>
@@ -15957,9 +15981,9 @@
                 <a:cs typeface="Courier New"/>
                 <a:sym typeface="Courier New"/>
               </a:rPr>
-              <a:t>return</a:t>
-            </a:r>
-            <a:endParaRPr sz="800">
+              <a:t>ret()</a:t>
+            </a:r>
+            <a:endParaRPr sz="800" dirty="0">
               <a:solidFill>
                 <a:schemeClr val="dk1"/>
               </a:solidFill>
@@ -15984,7 +16008,7 @@
               <a:buFont typeface="Courier New"/>
               <a:buNone/>
             </a:pPr>
-            <a:endParaRPr sz="800">
+            <a:endParaRPr sz="800" dirty="0">
               <a:solidFill>
                 <a:schemeClr val="dk1"/>
               </a:solidFill>
@@ -16010,7 +16034,7 @@
               <a:buNone/>
             </a:pPr>
             <a:r>
-              <a:rPr lang="en-US" sz="800">
+              <a:rPr lang="en-US" sz="800" dirty="0" err="1">
                 <a:solidFill>
                   <a:schemeClr val="dk1"/>
                 </a:solidFill>
@@ -16019,9 +16043,21 @@
                 <a:cs typeface="Courier New"/>
                 <a:sym typeface="Courier New"/>
               </a:rPr>
-              <a:t>leLanguage(1)</a:t>
-            </a:r>
-            <a:endParaRPr sz="800">
+              <a:t>leLanguage</a:t>
+            </a:r>
+            <a:r>
+              <a:rPr lang="en-US" sz="800" dirty="0">
+                <a:solidFill>
+                  <a:schemeClr val="dk1"/>
+                </a:solidFill>
+                <a:latin typeface="Courier New"/>
+                <a:ea typeface="Courier New"/>
+                <a:cs typeface="Courier New"/>
+                <a:sym typeface="Courier New"/>
+              </a:rPr>
+              <a:t>(1)</a:t>
+            </a:r>
+            <a:endParaRPr sz="800" dirty="0">
               <a:solidFill>
                 <a:schemeClr val="dk1"/>
               </a:solidFill>
@@ -16047,7 +16083,7 @@
               <a:buNone/>
             </a:pPr>
             <a:r>
-              <a:rPr lang="en-US" sz="800">
+              <a:rPr lang="en-US" sz="800" dirty="0">
                 <a:solidFill>
                   <a:schemeClr val="dk1"/>
                 </a:solidFill>
@@ -16058,7 +16094,7 @@
               </a:rPr>
               <a:t>Java Statements</a:t>
             </a:r>
-            <a:endParaRPr sz="800">
+            <a:endParaRPr sz="800" dirty="0">
               <a:solidFill>
                 <a:schemeClr val="dk1"/>
               </a:solidFill>
@@ -16083,7 +16119,7 @@
               <a:buFont typeface="Courier New"/>
               <a:buNone/>
             </a:pPr>
-            <a:endParaRPr sz="800">
+            <a:endParaRPr sz="800" dirty="0">
               <a:solidFill>
                 <a:schemeClr val="dk1"/>
               </a:solidFill>
@@ -16109,7 +16145,7 @@
               <a:buNone/>
             </a:pPr>
             <a:r>
-              <a:rPr lang="en-US" sz="800">
+              <a:rPr lang="en-US" sz="800" dirty="0" err="1">
                 <a:solidFill>
                   <a:schemeClr val="dk1"/>
                 </a:solidFill>
@@ -16118,9 +16154,21 @@
                 <a:cs typeface="Courier New"/>
                 <a:sym typeface="Courier New"/>
               </a:rPr>
-              <a:t>leLanguage(2)</a:t>
-            </a:r>
-            <a:endParaRPr sz="800">
+              <a:t>leLanguage</a:t>
+            </a:r>
+            <a:r>
+              <a:rPr lang="en-US" sz="800" dirty="0">
+                <a:solidFill>
+                  <a:schemeClr val="dk1"/>
+                </a:solidFill>
+                <a:latin typeface="Courier New"/>
+                <a:ea typeface="Courier New"/>
+                <a:cs typeface="Courier New"/>
+                <a:sym typeface="Courier New"/>
+              </a:rPr>
+              <a:t>(2)</a:t>
+            </a:r>
+            <a:endParaRPr sz="800" dirty="0">
               <a:solidFill>
                 <a:schemeClr val="dk1"/>
               </a:solidFill>
@@ -16146,7 +16194,7 @@
               <a:buNone/>
             </a:pPr>
             <a:r>
-              <a:rPr lang="en-US" sz="800">
+              <a:rPr lang="en-US" sz="800" dirty="0">
                 <a:solidFill>
                   <a:schemeClr val="dk1"/>
                 </a:solidFill>
@@ -16157,7 +16205,7 @@
               </a:rPr>
               <a:t>Python Statements</a:t>
             </a:r>
-            <a:endParaRPr sz="800">
+            <a:endParaRPr sz="800" dirty="0">
               <a:solidFill>
                 <a:schemeClr val="dk1"/>
               </a:solidFill>
@@ -16178,7 +16226,7 @@
         <p:spPr>
           <a:xfrm>
             <a:off x="5603024" y="1525340"/>
-            <a:ext cx="3463703" cy="3016180"/>
+            <a:ext cx="3463703" cy="3385512"/>
           </a:xfrm>
           <a:prstGeom prst="rect">
             <a:avLst/>
@@ -16360,6 +16408,102 @@
                 <a:sym typeface="Courier New"/>
               </a:rPr>
               <a:t>)</a:t>
+            </a:r>
+          </a:p>
+          <a:p>
+            <a:pPr marL="0" lvl="0" indent="0" algn="l" rtl="0">
+              <a:spcBef>
+                <a:spcPts val="0"/>
+              </a:spcBef>
+              <a:spcAft>
+                <a:spcPts val="0"/>
+              </a:spcAft>
+              <a:buClr>
+                <a:schemeClr val="dk1"/>
+              </a:buClr>
+              <a:buSzPts val="800"/>
+              <a:buFont typeface="Courier New"/>
+              <a:buNone/>
+            </a:pPr>
+            <a:r>
+              <a:rPr lang="en-US" sz="800" dirty="0">
+                <a:solidFill>
+                  <a:schemeClr val="dk1"/>
+                </a:solidFill>
+                <a:latin typeface="Courier New"/>
+                <a:ea typeface="Courier New"/>
+                <a:cs typeface="Courier New"/>
+                <a:sym typeface="Courier New"/>
+              </a:rPr>
+              <a:t>call(label)</a:t>
+            </a:r>
+          </a:p>
+          <a:p>
+            <a:pPr marL="0" lvl="0" indent="0" algn="l" rtl="0">
+              <a:spcBef>
+                <a:spcPts val="0"/>
+              </a:spcBef>
+              <a:spcAft>
+                <a:spcPts val="0"/>
+              </a:spcAft>
+              <a:buClr>
+                <a:schemeClr val="dk1"/>
+              </a:buClr>
+              <a:buSzPts val="800"/>
+              <a:buFont typeface="Courier New"/>
+              <a:buNone/>
+            </a:pPr>
+            <a:r>
+              <a:rPr lang="en-US" sz="800" dirty="0" err="1">
+                <a:solidFill>
+                  <a:schemeClr val="dk1"/>
+                </a:solidFill>
+                <a:latin typeface="Courier New"/>
+                <a:ea typeface="Courier New"/>
+                <a:cs typeface="Courier New"/>
+                <a:sym typeface="Courier New"/>
+              </a:rPr>
+              <a:t>callif</a:t>
+            </a:r>
+            <a:r>
+              <a:rPr lang="en-US" sz="800" dirty="0">
+                <a:solidFill>
+                  <a:schemeClr val="dk1"/>
+                </a:solidFill>
+                <a:latin typeface="Courier New"/>
+                <a:ea typeface="Courier New"/>
+                <a:cs typeface="Courier New"/>
+                <a:sym typeface="Courier New"/>
+              </a:rPr>
+              <a:t>(condition, label)</a:t>
+            </a:r>
+          </a:p>
+          <a:p>
+            <a:pPr marL="0" lvl="0" indent="0" algn="l" rtl="0">
+              <a:spcBef>
+                <a:spcPts val="0"/>
+              </a:spcBef>
+              <a:spcAft>
+                <a:spcPts val="0"/>
+              </a:spcAft>
+              <a:buClr>
+                <a:schemeClr val="dk1"/>
+              </a:buClr>
+              <a:buSzPts val="800"/>
+              <a:buFont typeface="Courier New"/>
+              <a:buNone/>
+            </a:pPr>
+            <a:r>
+              <a:rPr lang="en-US" sz="800" dirty="0">
+                <a:solidFill>
+                  <a:schemeClr val="dk1"/>
+                </a:solidFill>
+                <a:latin typeface="Courier New"/>
+                <a:ea typeface="Courier New"/>
+                <a:cs typeface="Courier New"/>
+                <a:sym typeface="Courier New"/>
+              </a:rPr>
+              <a:t>ret()</a:t>
             </a:r>
           </a:p>
           <a:p>
@@ -18038,7 +18182,7 @@
               <a:buNone/>
             </a:pPr>
             <a:r>
-              <a:rPr lang="en-US" sz="800" b="1">
+              <a:rPr lang="en-US" sz="800" b="1" dirty="0">
                 <a:solidFill>
                   <a:schemeClr val="dk1"/>
                 </a:solidFill>
@@ -18049,7 +18193,7 @@
               </a:rPr>
               <a:t>LEScript: General</a:t>
             </a:r>
-            <a:endParaRPr/>
+            <a:endParaRPr dirty="0"/>
           </a:p>
           <a:p>
             <a:pPr marL="0" marR="0" lvl="0" indent="0" algn="l" rtl="0">
@@ -18062,7 +18206,7 @@
               <a:buNone/>
             </a:pPr>
             <a:r>
-              <a:rPr lang="en-US" sz="800">
+              <a:rPr lang="en-US" sz="800" dirty="0" err="1">
                 <a:solidFill>
                   <a:schemeClr val="dk1"/>
                 </a:solidFill>
@@ -18071,9 +18215,21 @@
                 <a:cs typeface="Courier New"/>
                 <a:sym typeface="Courier New"/>
               </a:rPr>
-              <a:t>leLanguage(0|1|2)</a:t>
-            </a:r>
-            <a:endParaRPr sz="800">
+              <a:t>leLanguage</a:t>
+            </a:r>
+            <a:r>
+              <a:rPr lang="en-US" sz="800" dirty="0">
+                <a:solidFill>
+                  <a:schemeClr val="dk1"/>
+                </a:solidFill>
+                <a:latin typeface="Courier New"/>
+                <a:ea typeface="Courier New"/>
+                <a:cs typeface="Courier New"/>
+                <a:sym typeface="Courier New"/>
+              </a:rPr>
+              <a:t>(0|1|2)</a:t>
+            </a:r>
+            <a:endParaRPr sz="800" dirty="0">
               <a:solidFill>
                 <a:schemeClr val="dk1"/>
               </a:solidFill>
@@ -18094,7 +18250,7 @@
               <a:buNone/>
             </a:pPr>
             <a:r>
-              <a:rPr lang="en-US" sz="800">
+              <a:rPr lang="en-US" sz="800" dirty="0" err="1">
                 <a:solidFill>
                   <a:schemeClr val="dk1"/>
                 </a:solidFill>
@@ -18103,9 +18259,21 @@
                 <a:cs typeface="Courier New"/>
                 <a:sym typeface="Courier New"/>
               </a:rPr>
-              <a:t>exec_java(filename)</a:t>
-            </a:r>
-            <a:endParaRPr sz="800">
+              <a:t>exec_java</a:t>
+            </a:r>
+            <a:r>
+              <a:rPr lang="en-US" sz="800" dirty="0">
+                <a:solidFill>
+                  <a:schemeClr val="dk1"/>
+                </a:solidFill>
+                <a:latin typeface="Courier New"/>
+                <a:ea typeface="Courier New"/>
+                <a:cs typeface="Courier New"/>
+                <a:sym typeface="Courier New"/>
+              </a:rPr>
+              <a:t>(filename)</a:t>
+            </a:r>
+            <a:endParaRPr sz="800" dirty="0">
               <a:solidFill>
                 <a:schemeClr val="dk1"/>
               </a:solidFill>
@@ -18126,7 +18294,7 @@
               <a:buNone/>
             </a:pPr>
             <a:r>
-              <a:rPr lang="en-US" sz="800">
+              <a:rPr lang="en-US" sz="800" dirty="0" err="1">
                 <a:solidFill>
                   <a:schemeClr val="dk1"/>
                 </a:solidFill>
@@ -18135,9 +18303,21 @@
                 <a:cs typeface="Courier New"/>
                 <a:sym typeface="Courier New"/>
               </a:rPr>
-              <a:t>exec_python(filename)</a:t>
-            </a:r>
-            <a:endParaRPr sz="800">
+              <a:t>exec_python</a:t>
+            </a:r>
+            <a:r>
+              <a:rPr lang="en-US" sz="800" dirty="0">
+                <a:solidFill>
+                  <a:schemeClr val="dk1"/>
+                </a:solidFill>
+                <a:latin typeface="Courier New"/>
+                <a:ea typeface="Courier New"/>
+                <a:cs typeface="Courier New"/>
+                <a:sym typeface="Courier New"/>
+              </a:rPr>
+              <a:t>(filename)</a:t>
+            </a:r>
+            <a:endParaRPr sz="800" dirty="0">
               <a:solidFill>
                 <a:schemeClr val="dk1"/>
               </a:solidFill>
@@ -18158,7 +18338,7 @@
               <a:buNone/>
             </a:pPr>
             <a:r>
-              <a:rPr lang="en-US" sz="800">
+              <a:rPr lang="en-US" sz="800" dirty="0">
                 <a:solidFill>
                   <a:schemeClr val="dk1"/>
                 </a:solidFill>
@@ -18169,7 +18349,7 @@
               </a:rPr>
               <a:t>clear()</a:t>
             </a:r>
-            <a:endParaRPr/>
+            <a:endParaRPr dirty="0"/>
           </a:p>
           <a:p>
             <a:pPr marL="0" marR="0" lvl="0" indent="0" algn="l" rtl="0">
@@ -18187,7 +18367,7 @@
               <a:buNone/>
             </a:pPr>
             <a:r>
-              <a:rPr lang="en-US" sz="800">
+              <a:rPr lang="en-US" sz="800" dirty="0">
                 <a:solidFill>
                   <a:schemeClr val="dk1"/>
                 </a:solidFill>
@@ -18198,7 +18378,7 @@
               </a:rPr>
               <a:t>import(filename)</a:t>
             </a:r>
-            <a:endParaRPr/>
+            <a:endParaRPr dirty="0"/>
           </a:p>
           <a:p>
             <a:pPr marL="0" marR="0" lvl="0" indent="0" algn="l" rtl="0">
@@ -18216,7 +18396,7 @@
               <a:buNone/>
             </a:pPr>
             <a:r>
-              <a:rPr lang="en-US" sz="800">
+              <a:rPr lang="en-US" sz="800" dirty="0" err="1">
                 <a:solidFill>
                   <a:schemeClr val="dk1"/>
                 </a:solidFill>
@@ -18225,27 +18405,10 @@
                 <a:cs typeface="Courier New"/>
                 <a:sym typeface="Courier New"/>
               </a:rPr>
-              <a:t>var_name = 12.3      var_name = {other_var_name}</a:t>
-            </a:r>
-            <a:endParaRPr/>
-          </a:p>
-          <a:p>
-            <a:pPr marL="0" marR="0" lvl="0" indent="0" algn="l" rtl="0">
-              <a:spcBef>
-                <a:spcPts val="0"/>
-              </a:spcBef>
-              <a:spcAft>
-                <a:spcPts val="0"/>
-              </a:spcAft>
-              <a:buClr>
-                <a:schemeClr val="dk1"/>
-              </a:buClr>
-              <a:buSzPts val="800"/>
-              <a:buFont typeface="Courier New"/>
-              <a:buNone/>
-            </a:pPr>
-            <a:r>
-              <a:rPr lang="en-US" sz="800">
+              <a:t>var_name</a:t>
+            </a:r>
+            <a:r>
+              <a:rPr lang="en-US" sz="800" dirty="0">
                 <a:solidFill>
                   <a:schemeClr val="dk1"/>
                 </a:solidFill>
@@ -18254,27 +18417,10 @@
                 <a:cs typeface="Courier New"/>
                 <a:sym typeface="Courier New"/>
               </a:rPr>
-              <a:t>var_name++           var_name--</a:t>
-            </a:r>
-            <a:endParaRPr/>
-          </a:p>
-          <a:p>
-            <a:pPr marL="0" marR="0" lvl="0" indent="0" algn="l" rtl="0">
-              <a:spcBef>
-                <a:spcPts val="0"/>
-              </a:spcBef>
-              <a:spcAft>
-                <a:spcPts val="0"/>
-              </a:spcAft>
-              <a:buClr>
-                <a:schemeClr val="dk1"/>
-              </a:buClr>
-              <a:buSzPts val="800"/>
-              <a:buFont typeface="Courier New"/>
-              <a:buNone/>
-            </a:pPr>
-            <a:r>
-              <a:rPr lang="en-US" sz="800">
+              <a:t> = 12.3      </a:t>
+            </a:r>
+            <a:r>
+              <a:rPr lang="en-US" sz="800" dirty="0" err="1">
                 <a:solidFill>
                   <a:schemeClr val="dk1"/>
                 </a:solidFill>
@@ -18283,27 +18429,10 @@
                 <a:cs typeface="Courier New"/>
                 <a:sym typeface="Courier New"/>
               </a:rPr>
-              <a:t>var_name -= 17.5     var_name += 18</a:t>
-            </a:r>
-            <a:endParaRPr/>
-          </a:p>
-          <a:p>
-            <a:pPr marL="0" marR="0" lvl="0" indent="0" algn="l" rtl="0">
-              <a:spcBef>
-                <a:spcPts val="0"/>
-              </a:spcBef>
-              <a:spcAft>
-                <a:spcPts val="0"/>
-              </a:spcAft>
-              <a:buClr>
-                <a:schemeClr val="dk1"/>
-              </a:buClr>
-              <a:buSzPts val="800"/>
-              <a:buFont typeface="Courier New"/>
-              <a:buNone/>
-            </a:pPr>
-            <a:r>
-              <a:rPr lang="en-US" sz="800">
+              <a:t>var_name</a:t>
+            </a:r>
+            <a:r>
+              <a:rPr lang="en-US" sz="800" dirty="0">
                 <a:solidFill>
                   <a:schemeClr val="dk1"/>
                 </a:solidFill>
@@ -18312,27 +18441,10 @@
                 <a:cs typeface="Courier New"/>
                 <a:sym typeface="Courier New"/>
               </a:rPr>
-              <a:t>label:</a:t>
-            </a:r>
-            <a:endParaRPr/>
-          </a:p>
-          <a:p>
-            <a:pPr marL="0" marR="0" lvl="0" indent="0" algn="l" rtl="0">
-              <a:spcBef>
-                <a:spcPts val="0"/>
-              </a:spcBef>
-              <a:spcAft>
-                <a:spcPts val="0"/>
-              </a:spcAft>
-              <a:buClr>
-                <a:schemeClr val="dk1"/>
-              </a:buClr>
-              <a:buSzPts val="800"/>
-              <a:buFont typeface="Courier New"/>
-              <a:buNone/>
-            </a:pPr>
-            <a:r>
-              <a:rPr lang="en-US" sz="800">
+              <a:t> = {</a:t>
+            </a:r>
+            <a:r>
+              <a:rPr lang="en-US" sz="800" dirty="0" err="1">
                 <a:solidFill>
                   <a:schemeClr val="dk1"/>
                 </a:solidFill>
@@ -18341,9 +18453,257 @@
                 <a:cs typeface="Courier New"/>
                 <a:sym typeface="Courier New"/>
               </a:rPr>
-              <a:t>jump(label)     jump_gt_zero(var_name, label)</a:t>
-            </a:r>
-            <a:endParaRPr sz="800">
+              <a:t>other_var_name</a:t>
+            </a:r>
+            <a:r>
+              <a:rPr lang="en-US" sz="800" dirty="0">
+                <a:solidFill>
+                  <a:schemeClr val="dk1"/>
+                </a:solidFill>
+                <a:latin typeface="Courier New"/>
+                <a:ea typeface="Courier New"/>
+                <a:cs typeface="Courier New"/>
+                <a:sym typeface="Courier New"/>
+              </a:rPr>
+              <a:t>}</a:t>
+            </a:r>
+            <a:endParaRPr dirty="0"/>
+          </a:p>
+          <a:p>
+            <a:pPr marL="0" marR="0" lvl="0" indent="0" algn="l" rtl="0">
+              <a:spcBef>
+                <a:spcPts val="0"/>
+              </a:spcBef>
+              <a:spcAft>
+                <a:spcPts val="0"/>
+              </a:spcAft>
+              <a:buClr>
+                <a:schemeClr val="dk1"/>
+              </a:buClr>
+              <a:buSzPts val="800"/>
+              <a:buFont typeface="Courier New"/>
+              <a:buNone/>
+            </a:pPr>
+            <a:r>
+              <a:rPr lang="en-US" sz="800" dirty="0" err="1">
+                <a:solidFill>
+                  <a:schemeClr val="dk1"/>
+                </a:solidFill>
+                <a:latin typeface="Courier New"/>
+                <a:ea typeface="Courier New"/>
+                <a:cs typeface="Courier New"/>
+                <a:sym typeface="Courier New"/>
+              </a:rPr>
+              <a:t>var_name</a:t>
+            </a:r>
+            <a:r>
+              <a:rPr lang="en-US" sz="800" dirty="0">
+                <a:solidFill>
+                  <a:schemeClr val="dk1"/>
+                </a:solidFill>
+                <a:latin typeface="Courier New"/>
+                <a:ea typeface="Courier New"/>
+                <a:cs typeface="Courier New"/>
+                <a:sym typeface="Courier New"/>
+              </a:rPr>
+              <a:t>++           </a:t>
+            </a:r>
+            <a:r>
+              <a:rPr lang="en-US" sz="800" dirty="0" err="1">
+                <a:solidFill>
+                  <a:schemeClr val="dk1"/>
+                </a:solidFill>
+                <a:latin typeface="Courier New"/>
+                <a:ea typeface="Courier New"/>
+                <a:cs typeface="Courier New"/>
+                <a:sym typeface="Courier New"/>
+              </a:rPr>
+              <a:t>var_name</a:t>
+            </a:r>
+            <a:r>
+              <a:rPr lang="en-US" sz="800" dirty="0">
+                <a:solidFill>
+                  <a:schemeClr val="dk1"/>
+                </a:solidFill>
+                <a:latin typeface="Courier New"/>
+                <a:ea typeface="Courier New"/>
+                <a:cs typeface="Courier New"/>
+                <a:sym typeface="Courier New"/>
+              </a:rPr>
+              <a:t>--</a:t>
+            </a:r>
+            <a:endParaRPr dirty="0"/>
+          </a:p>
+          <a:p>
+            <a:pPr marL="0" marR="0" lvl="0" indent="0" algn="l" rtl="0">
+              <a:spcBef>
+                <a:spcPts val="0"/>
+              </a:spcBef>
+              <a:spcAft>
+                <a:spcPts val="0"/>
+              </a:spcAft>
+              <a:buClr>
+                <a:schemeClr val="dk1"/>
+              </a:buClr>
+              <a:buSzPts val="800"/>
+              <a:buFont typeface="Courier New"/>
+              <a:buNone/>
+            </a:pPr>
+            <a:r>
+              <a:rPr lang="en-US" sz="800" dirty="0" err="1">
+                <a:solidFill>
+                  <a:schemeClr val="dk1"/>
+                </a:solidFill>
+                <a:latin typeface="Courier New"/>
+                <a:ea typeface="Courier New"/>
+                <a:cs typeface="Courier New"/>
+                <a:sym typeface="Courier New"/>
+              </a:rPr>
+              <a:t>var_name</a:t>
+            </a:r>
+            <a:r>
+              <a:rPr lang="en-US" sz="800" dirty="0">
+                <a:solidFill>
+                  <a:schemeClr val="dk1"/>
+                </a:solidFill>
+                <a:latin typeface="Courier New"/>
+                <a:ea typeface="Courier New"/>
+                <a:cs typeface="Courier New"/>
+                <a:sym typeface="Courier New"/>
+              </a:rPr>
+              <a:t> -= 17.5     </a:t>
+            </a:r>
+            <a:r>
+              <a:rPr lang="en-US" sz="800" dirty="0" err="1">
+                <a:solidFill>
+                  <a:schemeClr val="dk1"/>
+                </a:solidFill>
+                <a:latin typeface="Courier New"/>
+                <a:ea typeface="Courier New"/>
+                <a:cs typeface="Courier New"/>
+                <a:sym typeface="Courier New"/>
+              </a:rPr>
+              <a:t>var_name</a:t>
+            </a:r>
+            <a:r>
+              <a:rPr lang="en-US" sz="800" dirty="0">
+                <a:solidFill>
+                  <a:schemeClr val="dk1"/>
+                </a:solidFill>
+                <a:latin typeface="Courier New"/>
+                <a:ea typeface="Courier New"/>
+                <a:cs typeface="Courier New"/>
+                <a:sym typeface="Courier New"/>
+              </a:rPr>
+              <a:t> += 18</a:t>
+            </a:r>
+            <a:endParaRPr dirty="0"/>
+          </a:p>
+          <a:p>
+            <a:pPr marL="0" marR="0" lvl="0" indent="0" algn="l" rtl="0">
+              <a:spcBef>
+                <a:spcPts val="0"/>
+              </a:spcBef>
+              <a:spcAft>
+                <a:spcPts val="0"/>
+              </a:spcAft>
+              <a:buClr>
+                <a:schemeClr val="dk1"/>
+              </a:buClr>
+              <a:buSzPts val="800"/>
+              <a:buFont typeface="Courier New"/>
+              <a:buNone/>
+            </a:pPr>
+            <a:r>
+              <a:rPr lang="en-US" sz="800" dirty="0">
+                <a:solidFill>
+                  <a:schemeClr val="dk1"/>
+                </a:solidFill>
+                <a:latin typeface="Courier New"/>
+                <a:ea typeface="Courier New"/>
+                <a:cs typeface="Courier New"/>
+                <a:sym typeface="Courier New"/>
+              </a:rPr>
+              <a:t>label:</a:t>
+            </a:r>
+            <a:endParaRPr dirty="0"/>
+          </a:p>
+          <a:p>
+            <a:pPr marL="0" marR="0" lvl="0" indent="0" algn="l" rtl="0">
+              <a:spcBef>
+                <a:spcPts val="0"/>
+              </a:spcBef>
+              <a:spcAft>
+                <a:spcPts val="0"/>
+              </a:spcAft>
+              <a:buClr>
+                <a:schemeClr val="dk1"/>
+              </a:buClr>
+              <a:buSzPts val="800"/>
+              <a:buFont typeface="Courier New"/>
+              <a:buNone/>
+            </a:pPr>
+            <a:r>
+              <a:rPr lang="en-US" sz="800" dirty="0">
+                <a:solidFill>
+                  <a:schemeClr val="dk1"/>
+                </a:solidFill>
+                <a:latin typeface="Courier New"/>
+                <a:ea typeface="Courier New"/>
+                <a:cs typeface="Courier New"/>
+                <a:sym typeface="Courier New"/>
+              </a:rPr>
+              <a:t>jump(label)     </a:t>
+            </a:r>
+            <a:r>
+              <a:rPr lang="en-US" sz="800" dirty="0" err="1">
+                <a:solidFill>
+                  <a:schemeClr val="dk1"/>
+                </a:solidFill>
+                <a:latin typeface="Courier New"/>
+                <a:ea typeface="Courier New"/>
+                <a:cs typeface="Courier New"/>
+                <a:sym typeface="Courier New"/>
+              </a:rPr>
+              <a:t>jump_gt_zero</a:t>
+            </a:r>
+            <a:r>
+              <a:rPr lang="en-US" sz="800" dirty="0">
+                <a:solidFill>
+                  <a:schemeClr val="dk1"/>
+                </a:solidFill>
+                <a:latin typeface="Courier New"/>
+                <a:ea typeface="Courier New"/>
+                <a:cs typeface="Courier New"/>
+                <a:sym typeface="Courier New"/>
+              </a:rPr>
+              <a:t>(</a:t>
+            </a:r>
+            <a:r>
+              <a:rPr lang="en-US" sz="800" dirty="0" err="1">
+                <a:solidFill>
+                  <a:schemeClr val="dk1"/>
+                </a:solidFill>
+                <a:latin typeface="Courier New"/>
+                <a:ea typeface="Courier New"/>
+                <a:cs typeface="Courier New"/>
+                <a:sym typeface="Courier New"/>
+              </a:rPr>
+              <a:t>var_name</a:t>
+            </a:r>
+            <a:r>
+              <a:rPr lang="en-US" sz="800" dirty="0">
+                <a:solidFill>
+                  <a:schemeClr val="dk1"/>
+                </a:solidFill>
+                <a:latin typeface="Courier New"/>
+                <a:ea typeface="Courier New"/>
+                <a:cs typeface="Courier New"/>
+                <a:sym typeface="Courier New"/>
+              </a:rPr>
+              <a:t>, label)</a:t>
+            </a:r>
+            <a:endParaRPr sz="800" dirty="0">
               <a:solidFill>
                 <a:schemeClr val="dk1"/>
               </a:solidFill>
@@ -18369,7 +18729,7 @@
               <a:buNone/>
             </a:pPr>
             <a:r>
-              <a:rPr lang="en-US" sz="800">
+              <a:rPr lang="en-US" sz="800" dirty="0">
                 <a:solidFill>
                   <a:schemeClr val="dk1"/>
                 </a:solidFill>
@@ -18380,7 +18740,7 @@
               </a:rPr>
               <a:t>call(label)     return </a:t>
             </a:r>
-            <a:endParaRPr sz="800">
+            <a:endParaRPr sz="800" dirty="0">
               <a:solidFill>
                 <a:schemeClr val="dk1"/>
               </a:solidFill>
@@ -18406,7 +18766,7 @@
               <a:buNone/>
             </a:pPr>
             <a:r>
-              <a:rPr lang="en-US" sz="800">
+              <a:rPr lang="en-US" sz="800" dirty="0">
                 <a:solidFill>
                   <a:schemeClr val="dk1"/>
                 </a:solidFill>
@@ -18417,7 +18777,7 @@
               </a:rPr>
               <a:t>prompt(message) sleep(seconds)</a:t>
             </a:r>
-            <a:endParaRPr/>
+            <a:endParaRPr dirty="0"/>
           </a:p>
           <a:p>
             <a:pPr marL="0" marR="0" lvl="0" indent="0" algn="l" rtl="0">
@@ -18435,7 +18795,7 @@
               <a:buNone/>
             </a:pPr>
             <a:r>
-              <a:rPr lang="en-US" sz="800">
+              <a:rPr lang="en-US" sz="800" dirty="0">
                 <a:solidFill>
                   <a:schemeClr val="dk1"/>
                 </a:solidFill>
@@ -18444,22 +18804,10 @@
                 <a:cs typeface="Courier New"/>
                 <a:sym typeface="Courier New"/>
               </a:rPr>
-              <a:t>assert(var_name, value)</a:t>
-            </a:r>
-            <a:endParaRPr/>
-          </a:p>
-          <a:p>
-            <a:pPr marL="0" marR="0" lvl="0" indent="0" algn="l" rtl="0">
-              <a:spcBef>
-                <a:spcPts val="0"/>
-              </a:spcBef>
-              <a:spcAft>
-                <a:spcPts val="0"/>
-              </a:spcAft>
-              <a:buNone/>
-            </a:pPr>
-            <a:r>
-              <a:rPr lang="en-US" sz="800">
+              <a:t>assert(</a:t>
+            </a:r>
+            <a:r>
+              <a:rPr lang="en-US" sz="800" dirty="0" err="1">
                 <a:solidFill>
                   <a:schemeClr val="dk1"/>
                 </a:solidFill>
@@ -18468,9 +18816,45 @@
                 <a:cs typeface="Courier New"/>
                 <a:sym typeface="Courier New"/>
               </a:rPr>
+              <a:t>var_name</a:t>
+            </a:r>
+            <a:r>
+              <a:rPr lang="en-US" sz="800" dirty="0">
+                <a:solidFill>
+                  <a:schemeClr val="dk1"/>
+                </a:solidFill>
+                <a:latin typeface="Courier New"/>
+                <a:ea typeface="Courier New"/>
+                <a:cs typeface="Courier New"/>
+                <a:sym typeface="Courier New"/>
+              </a:rPr>
+              <a:t>, value)</a:t>
+            </a:r>
+            <a:endParaRPr dirty="0"/>
+          </a:p>
+          <a:p>
+            <a:pPr marL="0" marR="0" lvl="0" indent="0" algn="l" rtl="0">
+              <a:spcBef>
+                <a:spcPts val="0"/>
+              </a:spcBef>
+              <a:spcAft>
+                <a:spcPts val="0"/>
+              </a:spcAft>
+              <a:buNone/>
+            </a:pPr>
+            <a:r>
+              <a:rPr lang="en-US" sz="800" dirty="0">
+                <a:solidFill>
+                  <a:schemeClr val="dk1"/>
+                </a:solidFill>
+                <a:latin typeface="Courier New"/>
+                <a:ea typeface="Courier New"/>
+                <a:cs typeface="Courier New"/>
+                <a:sym typeface="Courier New"/>
+              </a:rPr>
               <a:t>end</a:t>
             </a:r>
-            <a:endParaRPr/>
+            <a:endParaRPr dirty="0"/>
           </a:p>
           <a:p>
             <a:pPr marL="0" marR="0" lvl="0" indent="0" algn="l" rtl="0">
@@ -18482,7 +18866,7 @@
               </a:spcAft>
               <a:buNone/>
             </a:pPr>
-            <a:endParaRPr sz="800">
+            <a:endParaRPr sz="800" dirty="0">
               <a:solidFill>
                 <a:schemeClr val="dk1"/>
               </a:solidFill>
@@ -18503,7 +18887,7 @@
               <a:buNone/>
             </a:pPr>
             <a:r>
-              <a:rPr lang="en-US" sz="800">
+              <a:rPr lang="en-US" sz="800" dirty="0">
                 <a:solidFill>
                   <a:schemeClr val="dk1"/>
                 </a:solidFill>
@@ -18512,22 +18896,10 @@
                 <a:cs typeface="Courier New"/>
                 <a:sym typeface="Courier New"/>
               </a:rPr>
-              <a:t>connect(device_name)</a:t>
-            </a:r>
-            <a:endParaRPr/>
-          </a:p>
-          <a:p>
-            <a:pPr marL="0" marR="0" lvl="0" indent="0" algn="l" rtl="0">
-              <a:spcBef>
-                <a:spcPts val="0"/>
-              </a:spcBef>
-              <a:spcAft>
-                <a:spcPts val="0"/>
-              </a:spcAft>
-              <a:buNone/>
-            </a:pPr>
-            <a:r>
-              <a:rPr lang="en-US" sz="800">
+              <a:t>connect(</a:t>
+            </a:r>
+            <a:r>
+              <a:rPr lang="en-US" sz="800" dirty="0" err="1">
                 <a:solidFill>
                   <a:schemeClr val="dk1"/>
                 </a:solidFill>
@@ -18536,22 +18908,10 @@
                 <a:cs typeface="Courier New"/>
                 <a:sym typeface="Courier New"/>
               </a:rPr>
-              <a:t>connect_all()</a:t>
-            </a:r>
-            <a:endParaRPr/>
-          </a:p>
-          <a:p>
-            <a:pPr marL="0" marR="0" lvl="0" indent="0" algn="l" rtl="0">
-              <a:spcBef>
-                <a:spcPts val="0"/>
-              </a:spcBef>
-              <a:spcAft>
-                <a:spcPts val="0"/>
-              </a:spcAft>
-              <a:buNone/>
-            </a:pPr>
-            <a:r>
-              <a:rPr lang="en-US" sz="800">
+              <a:t>device_name</a:t>
+            </a:r>
+            <a:r>
+              <a:rPr lang="en-US" sz="800" dirty="0">
                 <a:solidFill>
                   <a:schemeClr val="dk1"/>
                 </a:solidFill>
@@ -18560,9 +18920,9 @@
                 <a:cs typeface="Courier New"/>
                 <a:sym typeface="Courier New"/>
               </a:rPr>
-              <a:t>disconnect(device_name)</a:t>
-            </a:r>
-            <a:endParaRPr/>
+              <a:t>)</a:t>
+            </a:r>
+            <a:endParaRPr dirty="0"/>
           </a:p>
           <a:p>
             <a:pPr marL="0" marR="0" lvl="0" indent="0" algn="l" rtl="0">
@@ -18575,7 +18935,7 @@
               <a:buNone/>
             </a:pPr>
             <a:r>
-              <a:rPr lang="en-US" sz="800">
+              <a:rPr lang="en-US" sz="800" dirty="0" err="1">
                 <a:solidFill>
                   <a:schemeClr val="dk1"/>
                 </a:solidFill>
@@ -18584,9 +18944,105 @@
                 <a:cs typeface="Courier New"/>
                 <a:sym typeface="Courier New"/>
               </a:rPr>
-              <a:t>disconnect_all()</a:t>
-            </a:r>
-            <a:endParaRPr sz="800">
+              <a:t>connect_all</a:t>
+            </a:r>
+            <a:r>
+              <a:rPr lang="en-US" sz="800" dirty="0">
+                <a:solidFill>
+                  <a:schemeClr val="dk1"/>
+                </a:solidFill>
+                <a:latin typeface="Courier New"/>
+                <a:ea typeface="Courier New"/>
+                <a:cs typeface="Courier New"/>
+                <a:sym typeface="Courier New"/>
+              </a:rPr>
+              <a:t>()</a:t>
+            </a:r>
+            <a:endParaRPr dirty="0"/>
+          </a:p>
+          <a:p>
+            <a:pPr marL="0" marR="0" lvl="0" indent="0" algn="l" rtl="0">
+              <a:spcBef>
+                <a:spcPts val="0"/>
+              </a:spcBef>
+              <a:spcAft>
+                <a:spcPts val="0"/>
+              </a:spcAft>
+              <a:buNone/>
+            </a:pPr>
+            <a:r>
+              <a:rPr lang="en-US" sz="800" dirty="0">
+                <a:solidFill>
+                  <a:schemeClr val="dk1"/>
+                </a:solidFill>
+                <a:latin typeface="Courier New"/>
+                <a:ea typeface="Courier New"/>
+                <a:cs typeface="Courier New"/>
+                <a:sym typeface="Courier New"/>
+              </a:rPr>
+              <a:t>disconnect(</a:t>
+            </a:r>
+            <a:r>
+              <a:rPr lang="en-US" sz="800" dirty="0" err="1">
+                <a:solidFill>
+                  <a:schemeClr val="dk1"/>
+                </a:solidFill>
+                <a:latin typeface="Courier New"/>
+                <a:ea typeface="Courier New"/>
+                <a:cs typeface="Courier New"/>
+                <a:sym typeface="Courier New"/>
+              </a:rPr>
+              <a:t>device_name</a:t>
+            </a:r>
+            <a:r>
+              <a:rPr lang="en-US" sz="800" dirty="0">
+                <a:solidFill>
+                  <a:schemeClr val="dk1"/>
+                </a:solidFill>
+                <a:latin typeface="Courier New"/>
+                <a:ea typeface="Courier New"/>
+                <a:cs typeface="Courier New"/>
+                <a:sym typeface="Courier New"/>
+              </a:rPr>
+              <a:t>)</a:t>
+            </a:r>
+            <a:endParaRPr dirty="0"/>
+          </a:p>
+          <a:p>
+            <a:pPr marL="0" marR="0" lvl="0" indent="0" algn="l" rtl="0">
+              <a:spcBef>
+                <a:spcPts val="0"/>
+              </a:spcBef>
+              <a:spcAft>
+                <a:spcPts val="0"/>
+              </a:spcAft>
+              <a:buNone/>
+            </a:pPr>
+            <a:r>
+              <a:rPr lang="en-US" sz="800" dirty="0" err="1">
+                <a:solidFill>
+                  <a:schemeClr val="dk1"/>
+                </a:solidFill>
+                <a:latin typeface="Courier New"/>
+                <a:ea typeface="Courier New"/>
+                <a:cs typeface="Courier New"/>
+                <a:sym typeface="Courier New"/>
+              </a:rPr>
+              <a:t>disconnect_all</a:t>
+            </a:r>
+            <a:r>
+              <a:rPr lang="en-US" sz="800" dirty="0">
+                <a:solidFill>
+                  <a:schemeClr val="dk1"/>
+                </a:solidFill>
+                <a:latin typeface="Courier New"/>
+                <a:ea typeface="Courier New"/>
+                <a:cs typeface="Courier New"/>
+                <a:sym typeface="Courier New"/>
+              </a:rPr>
+              <a:t>()</a:t>
+            </a:r>
+            <a:endParaRPr sz="800" dirty="0">
               <a:solidFill>
                 <a:schemeClr val="dk1"/>
               </a:solidFill>
@@ -18606,7 +19062,7 @@
               </a:spcAft>
               <a:buNone/>
             </a:pPr>
-            <a:endParaRPr sz="800">
+            <a:endParaRPr sz="800" dirty="0">
               <a:solidFill>
                 <a:schemeClr val="dk1"/>
               </a:solidFill>
@@ -18631,7 +19087,7 @@
               <a:buFont typeface="Calibri"/>
               <a:buNone/>
             </a:pPr>
-            <a:endParaRPr sz="800">
+            <a:endParaRPr sz="800" dirty="0">
               <a:solidFill>
                 <a:schemeClr val="dk1"/>
               </a:solidFill>

</xml_diff>